<commit_message>
Add white background for better viewability
</commit_message>
<xml_diff>
--- a/other/trial-structure.pptx
+++ b/other/trial-structure.pptx
@@ -259,7 +259,7 @@
           <a:p>
             <a:fld id="{DB2F63FD-4BE1-1D49-BD1E-41F43D9C0931}" type="datetimeFigureOut">
               <a:rPr lang="de-DE" smtClean="0"/>
-              <a:t>20.08.23</a:t>
+              <a:t>02.09.23</a:t>
             </a:fld>
             <a:endParaRPr lang="de-DE"/>
           </a:p>
@@ -457,7 +457,7 @@
           <a:p>
             <a:fld id="{DB2F63FD-4BE1-1D49-BD1E-41F43D9C0931}" type="datetimeFigureOut">
               <a:rPr lang="de-DE" smtClean="0"/>
-              <a:t>20.08.23</a:t>
+              <a:t>02.09.23</a:t>
             </a:fld>
             <a:endParaRPr lang="de-DE"/>
           </a:p>
@@ -665,7 +665,7 @@
           <a:p>
             <a:fld id="{DB2F63FD-4BE1-1D49-BD1E-41F43D9C0931}" type="datetimeFigureOut">
               <a:rPr lang="de-DE" smtClean="0"/>
-              <a:t>20.08.23</a:t>
+              <a:t>02.09.23</a:t>
             </a:fld>
             <a:endParaRPr lang="de-DE"/>
           </a:p>
@@ -863,7 +863,7 @@
           <a:p>
             <a:fld id="{DB2F63FD-4BE1-1D49-BD1E-41F43D9C0931}" type="datetimeFigureOut">
               <a:rPr lang="de-DE" smtClean="0"/>
-              <a:t>20.08.23</a:t>
+              <a:t>02.09.23</a:t>
             </a:fld>
             <a:endParaRPr lang="de-DE"/>
           </a:p>
@@ -1138,7 +1138,7 @@
           <a:p>
             <a:fld id="{DB2F63FD-4BE1-1D49-BD1E-41F43D9C0931}" type="datetimeFigureOut">
               <a:rPr lang="de-DE" smtClean="0"/>
-              <a:t>20.08.23</a:t>
+              <a:t>02.09.23</a:t>
             </a:fld>
             <a:endParaRPr lang="de-DE"/>
           </a:p>
@@ -1403,7 +1403,7 @@
           <a:p>
             <a:fld id="{DB2F63FD-4BE1-1D49-BD1E-41F43D9C0931}" type="datetimeFigureOut">
               <a:rPr lang="de-DE" smtClean="0"/>
-              <a:t>20.08.23</a:t>
+              <a:t>02.09.23</a:t>
             </a:fld>
             <a:endParaRPr lang="de-DE"/>
           </a:p>
@@ -1815,7 +1815,7 @@
           <a:p>
             <a:fld id="{DB2F63FD-4BE1-1D49-BD1E-41F43D9C0931}" type="datetimeFigureOut">
               <a:rPr lang="de-DE" smtClean="0"/>
-              <a:t>20.08.23</a:t>
+              <a:t>02.09.23</a:t>
             </a:fld>
             <a:endParaRPr lang="de-DE"/>
           </a:p>
@@ -1956,7 +1956,7 @@
           <a:p>
             <a:fld id="{DB2F63FD-4BE1-1D49-BD1E-41F43D9C0931}" type="datetimeFigureOut">
               <a:rPr lang="de-DE" smtClean="0"/>
-              <a:t>20.08.23</a:t>
+              <a:t>02.09.23</a:t>
             </a:fld>
             <a:endParaRPr lang="de-DE"/>
           </a:p>
@@ -2069,7 +2069,7 @@
           <a:p>
             <a:fld id="{DB2F63FD-4BE1-1D49-BD1E-41F43D9C0931}" type="datetimeFigureOut">
               <a:rPr lang="de-DE" smtClean="0"/>
-              <a:t>20.08.23</a:t>
+              <a:t>02.09.23</a:t>
             </a:fld>
             <a:endParaRPr lang="de-DE"/>
           </a:p>
@@ -2380,7 +2380,7 @@
           <a:p>
             <a:fld id="{DB2F63FD-4BE1-1D49-BD1E-41F43D9C0931}" type="datetimeFigureOut">
               <a:rPr lang="de-DE" smtClean="0"/>
-              <a:t>20.08.23</a:t>
+              <a:t>02.09.23</a:t>
             </a:fld>
             <a:endParaRPr lang="de-DE"/>
           </a:p>
@@ -2668,7 +2668,7 @@
           <a:p>
             <a:fld id="{DB2F63FD-4BE1-1D49-BD1E-41F43D9C0931}" type="datetimeFigureOut">
               <a:rPr lang="de-DE" smtClean="0"/>
-              <a:t>20.08.23</a:t>
+              <a:t>02.09.23</a:t>
             </a:fld>
             <a:endParaRPr lang="de-DE"/>
           </a:p>
@@ -2909,7 +2909,7 @@
           <a:p>
             <a:fld id="{DB2F63FD-4BE1-1D49-BD1E-41F43D9C0931}" type="datetimeFigureOut">
               <a:rPr lang="de-DE" smtClean="0"/>
-              <a:t>20.08.23</a:t>
+              <a:t>02.09.23</a:t>
             </a:fld>
             <a:endParaRPr lang="de-DE"/>
           </a:p>
@@ -3336,10 +3336,10 @@
       </p:grpSpPr>
       <p:grpSp>
         <p:nvGrpSpPr>
-          <p:cNvPr id="23" name="Gruppieren 22">
-            <a:extLst>
-              <a:ext uri="{FF2B5EF4-FFF2-40B4-BE49-F238E27FC236}">
-                <a16:creationId xmlns:a16="http://schemas.microsoft.com/office/drawing/2014/main" id="{A93D49C3-FDE9-4635-F3F7-5A5EAC91C8A2}"/>
+          <p:cNvPr id="8" name="Gruppieren 7">
+            <a:extLst>
+              <a:ext uri="{FF2B5EF4-FFF2-40B4-BE49-F238E27FC236}">
+                <a16:creationId xmlns:a16="http://schemas.microsoft.com/office/drawing/2014/main" id="{03F45E3B-5A6C-7FD2-B76E-14780FF1F4C7}"/>
               </a:ext>
             </a:extLst>
           </p:cNvPr>
@@ -3348,12 +3348,66 @@
         </p:nvGrpSpPr>
         <p:grpSpPr>
           <a:xfrm>
-            <a:off x="2168917" y="704789"/>
-            <a:ext cx="7854165" cy="5448421"/>
-            <a:chOff x="2168917" y="704789"/>
-            <a:chExt cx="7854165" cy="5448421"/>
+            <a:off x="2118871" y="513000"/>
+            <a:ext cx="7954258" cy="5832000"/>
+            <a:chOff x="2068824" y="441434"/>
+            <a:chExt cx="7954258" cy="5832000"/>
           </a:xfrm>
         </p:grpSpPr>
+        <p:sp>
+          <p:nvSpPr>
+            <p:cNvPr id="2" name="Rechteck 1">
+              <a:extLst>
+                <a:ext uri="{FF2B5EF4-FFF2-40B4-BE49-F238E27FC236}">
+                  <a16:creationId xmlns:a16="http://schemas.microsoft.com/office/drawing/2014/main" id="{38773055-00F7-A277-3994-5DF4CBA412DF}"/>
+                </a:ext>
+              </a:extLst>
+            </p:cNvPr>
+            <p:cNvSpPr/>
+            <p:nvPr/>
+          </p:nvSpPr>
+          <p:spPr>
+            <a:xfrm>
+              <a:off x="2068824" y="441434"/>
+              <a:ext cx="7920000" cy="5832000"/>
+            </a:xfrm>
+            <a:prstGeom prst="rect">
+              <a:avLst/>
+            </a:prstGeom>
+            <a:solidFill>
+              <a:schemeClr val="bg1"/>
+            </a:solidFill>
+            <a:ln>
+              <a:solidFill>
+                <a:schemeClr val="bg1"/>
+              </a:solidFill>
+            </a:ln>
+          </p:spPr>
+          <p:style>
+            <a:lnRef idx="2">
+              <a:schemeClr val="accent1">
+                <a:shade val="15000"/>
+              </a:schemeClr>
+            </a:lnRef>
+            <a:fillRef idx="1">
+              <a:schemeClr val="accent1"/>
+            </a:fillRef>
+            <a:effectRef idx="0">
+              <a:schemeClr val="accent1"/>
+            </a:effectRef>
+            <a:fontRef idx="minor">
+              <a:schemeClr val="lt1"/>
+            </a:fontRef>
+          </p:style>
+          <p:txBody>
+            <a:bodyPr rtlCol="0" anchor="ctr"/>
+            <a:lstStyle/>
+            <a:p>
+              <a:pPr algn="ctr"/>
+              <a:endParaRPr lang="de-DE"/>
+            </a:p>
+          </p:txBody>
+        </p:sp>
         <p:cxnSp>
           <p:nvCxnSpPr>
             <p:cNvPr id="3" name="Gerade Verbindung 2">

</xml_diff>

<commit_message>
Update figures illustrating trial structure
</commit_message>
<xml_diff>
--- a/other/trial-structure.pptx
+++ b/other/trial-structure.pptx
@@ -259,7 +259,7 @@
           <a:p>
             <a:fld id="{DB2F63FD-4BE1-1D49-BD1E-41F43D9C0931}" type="datetimeFigureOut">
               <a:rPr lang="de-DE" smtClean="0"/>
-              <a:t>02.09.23</a:t>
+              <a:t>18.09.23</a:t>
             </a:fld>
             <a:endParaRPr lang="de-DE"/>
           </a:p>
@@ -457,7 +457,7 @@
           <a:p>
             <a:fld id="{DB2F63FD-4BE1-1D49-BD1E-41F43D9C0931}" type="datetimeFigureOut">
               <a:rPr lang="de-DE" smtClean="0"/>
-              <a:t>02.09.23</a:t>
+              <a:t>18.09.23</a:t>
             </a:fld>
             <a:endParaRPr lang="de-DE"/>
           </a:p>
@@ -665,7 +665,7 @@
           <a:p>
             <a:fld id="{DB2F63FD-4BE1-1D49-BD1E-41F43D9C0931}" type="datetimeFigureOut">
               <a:rPr lang="de-DE" smtClean="0"/>
-              <a:t>02.09.23</a:t>
+              <a:t>18.09.23</a:t>
             </a:fld>
             <a:endParaRPr lang="de-DE"/>
           </a:p>
@@ -863,7 +863,7 @@
           <a:p>
             <a:fld id="{DB2F63FD-4BE1-1D49-BD1E-41F43D9C0931}" type="datetimeFigureOut">
               <a:rPr lang="de-DE" smtClean="0"/>
-              <a:t>02.09.23</a:t>
+              <a:t>18.09.23</a:t>
             </a:fld>
             <a:endParaRPr lang="de-DE"/>
           </a:p>
@@ -1138,7 +1138,7 @@
           <a:p>
             <a:fld id="{DB2F63FD-4BE1-1D49-BD1E-41F43D9C0931}" type="datetimeFigureOut">
               <a:rPr lang="de-DE" smtClean="0"/>
-              <a:t>02.09.23</a:t>
+              <a:t>18.09.23</a:t>
             </a:fld>
             <a:endParaRPr lang="de-DE"/>
           </a:p>
@@ -1403,7 +1403,7 @@
           <a:p>
             <a:fld id="{DB2F63FD-4BE1-1D49-BD1E-41F43D9C0931}" type="datetimeFigureOut">
               <a:rPr lang="de-DE" smtClean="0"/>
-              <a:t>02.09.23</a:t>
+              <a:t>18.09.23</a:t>
             </a:fld>
             <a:endParaRPr lang="de-DE"/>
           </a:p>
@@ -1815,7 +1815,7 @@
           <a:p>
             <a:fld id="{DB2F63FD-4BE1-1D49-BD1E-41F43D9C0931}" type="datetimeFigureOut">
               <a:rPr lang="de-DE" smtClean="0"/>
-              <a:t>02.09.23</a:t>
+              <a:t>18.09.23</a:t>
             </a:fld>
             <a:endParaRPr lang="de-DE"/>
           </a:p>
@@ -1956,7 +1956,7 @@
           <a:p>
             <a:fld id="{DB2F63FD-4BE1-1D49-BD1E-41F43D9C0931}" type="datetimeFigureOut">
               <a:rPr lang="de-DE" smtClean="0"/>
-              <a:t>02.09.23</a:t>
+              <a:t>18.09.23</a:t>
             </a:fld>
             <a:endParaRPr lang="de-DE"/>
           </a:p>
@@ -2069,7 +2069,7 @@
           <a:p>
             <a:fld id="{DB2F63FD-4BE1-1D49-BD1E-41F43D9C0931}" type="datetimeFigureOut">
               <a:rPr lang="de-DE" smtClean="0"/>
-              <a:t>02.09.23</a:t>
+              <a:t>18.09.23</a:t>
             </a:fld>
             <a:endParaRPr lang="de-DE"/>
           </a:p>
@@ -2380,7 +2380,7 @@
           <a:p>
             <a:fld id="{DB2F63FD-4BE1-1D49-BD1E-41F43D9C0931}" type="datetimeFigureOut">
               <a:rPr lang="de-DE" smtClean="0"/>
-              <a:t>02.09.23</a:t>
+              <a:t>18.09.23</a:t>
             </a:fld>
             <a:endParaRPr lang="de-DE"/>
           </a:p>
@@ -2668,7 +2668,7 @@
           <a:p>
             <a:fld id="{DB2F63FD-4BE1-1D49-BD1E-41F43D9C0931}" type="datetimeFigureOut">
               <a:rPr lang="de-DE" smtClean="0"/>
-              <a:t>02.09.23</a:t>
+              <a:t>18.09.23</a:t>
             </a:fld>
             <a:endParaRPr lang="de-DE"/>
           </a:p>
@@ -2909,7 +2909,7 @@
           <a:p>
             <a:fld id="{DB2F63FD-4BE1-1D49-BD1E-41F43D9C0931}" type="datetimeFigureOut">
               <a:rPr lang="de-DE" smtClean="0"/>
-              <a:t>02.09.23</a:t>
+              <a:t>18.09.23</a:t>
             </a:fld>
             <a:endParaRPr lang="de-DE"/>
           </a:p>
@@ -3473,8 +3473,8 @@
           </p:blipFill>
           <p:spPr>
             <a:xfrm>
-              <a:off x="2530796" y="704789"/>
-              <a:ext cx="2870983" cy="1855837"/>
+              <a:off x="2530797" y="704789"/>
+              <a:ext cx="2870981" cy="1855837"/>
             </a:xfrm>
             <a:prstGeom prst="rect">
               <a:avLst/>
@@ -3519,8 +3519,8 @@
           </p:blipFill>
           <p:spPr>
             <a:xfrm>
-              <a:off x="3728615" y="1853182"/>
-              <a:ext cx="2870983" cy="1855837"/>
+              <a:off x="3728616" y="1853182"/>
+              <a:ext cx="2870981" cy="1855837"/>
             </a:xfrm>
             <a:prstGeom prst="rect">
               <a:avLst/>
@@ -3568,8 +3568,8 @@
           </p:blipFill>
           <p:spPr>
             <a:xfrm>
-              <a:off x="4926435" y="3001575"/>
-              <a:ext cx="2870983" cy="1855837"/>
+              <a:off x="4926436" y="3001575"/>
+              <a:ext cx="2870981" cy="1855837"/>
             </a:xfrm>
             <a:prstGeom prst="rect">
               <a:avLst/>
@@ -3614,8 +3614,8 @@
           </p:blipFill>
           <p:spPr>
             <a:xfrm>
-              <a:off x="6124254" y="4149968"/>
-              <a:ext cx="2870983" cy="1855837"/>
+              <a:off x="6124255" y="4149968"/>
+              <a:ext cx="2870981" cy="1855837"/>
             </a:xfrm>
             <a:prstGeom prst="rect">
               <a:avLst/>

</xml_diff>